<commit_message>
Added additional links into lesson 4 slideshow
</commit_message>
<xml_diff>
--- a/pptx/Lesson4.pptx
+++ b/pptx/Lesson4.pptx
@@ -5,10 +5,10 @@
     <p:sldMasterId id="2147483648" r:id="rId1"/>
   </p:sldMasterIdLst>
   <p:notesMasterIdLst>
-    <p:notesMasterId r:id="rId7"/>
+    <p:notesMasterId r:id="rId9"/>
   </p:notesMasterIdLst>
   <p:handoutMasterIdLst>
-    <p:handoutMasterId r:id="rId8"/>
+    <p:handoutMasterId r:id="rId10"/>
   </p:handoutMasterIdLst>
   <p:sldIdLst>
     <p:sldId id="256" r:id="rId2"/>
@@ -16,6 +16,8 @@
     <p:sldId id="294" r:id="rId4"/>
     <p:sldId id="295" r:id="rId5"/>
     <p:sldId id="296" r:id="rId6"/>
+    <p:sldId id="297" r:id="rId7"/>
+    <p:sldId id="298" r:id="rId8"/>
   </p:sldIdLst>
   <p:sldSz cx="9144000" cy="6858000" type="screen4x3"/>
   <p:notesSz cx="6858000" cy="9144000"/>
@@ -199,7 +201,7 @@
           <a:p>
             <a:fld id="{B0CE65C1-6F66-F049-B38D-B233E1822E7D}" type="datetimeFigureOut">
               <a:rPr lang="en-US" smtClean="0"/>
-              <a:t>11/03/2014</a:t>
+              <a:t>31/03/2014</a:t>
             </a:fld>
             <a:endParaRPr lang="en-US"/>
           </a:p>
@@ -365,7 +367,7 @@
           <a:p>
             <a:fld id="{BE2109CD-86B0-3745-A085-594845E649BC}" type="datetimeFigureOut">
               <a:rPr lang="en-US" smtClean="0"/>
-              <a:t>11/03/2014</a:t>
+              <a:t>31/03/2014</a:t>
             </a:fld>
             <a:endParaRPr lang="en-US"/>
           </a:p>
@@ -852,13 +854,8 @@
             </a:r>
             <a:r>
               <a:rPr lang="en-US" baseline="0" dirty="0" smtClean="0"/>
-              <a:t> to make </a:t>
-            </a:r>
-            <a:r>
-              <a:rPr lang="en-US" baseline="0" dirty="0" smtClean="0"/>
-              <a:t>today</a:t>
-            </a:r>
-            <a:endParaRPr lang="en-US" baseline="0" dirty="0" smtClean="0"/>
+              <a:t> to make today</a:t>
+            </a:r>
           </a:p>
         </p:txBody>
       </p:sp>
@@ -1179,7 +1176,7 @@
           <a:p>
             <a:fld id="{2062DF77-0271-1B45-AD0C-C1D57DEF0EF9}" type="datetime1">
               <a:rPr lang="en-GB" smtClean="0"/>
-              <a:t>11/03/2014</a:t>
+              <a:t>31/03/2014</a:t>
             </a:fld>
             <a:endParaRPr lang="en-US" dirty="0"/>
           </a:p>
@@ -1365,7 +1362,7 @@
           <a:p>
             <a:fld id="{5012EA67-3770-5C4B-B1BA-5C204BFCD73B}" type="datetime1">
               <a:rPr lang="en-GB" smtClean="0"/>
-              <a:t>11/03/2014</a:t>
+              <a:t>31/03/2014</a:t>
             </a:fld>
             <a:endParaRPr lang="en-US"/>
           </a:p>
@@ -1561,7 +1558,7 @@
           <a:p>
             <a:fld id="{56E1F701-C9AB-FF4A-AA91-35C7C13E7261}" type="datetime1">
               <a:rPr lang="en-GB" smtClean="0"/>
-              <a:t>11/03/2014</a:t>
+              <a:t>31/03/2014</a:t>
             </a:fld>
             <a:endParaRPr lang="en-US"/>
           </a:p>
@@ -1747,7 +1744,7 @@
           <a:p>
             <a:fld id="{74A7F700-C79E-5C49-AA6D-F6605B10518E}" type="datetime1">
               <a:rPr lang="en-GB" smtClean="0"/>
-              <a:t>11/03/2014</a:t>
+              <a:t>31/03/2014</a:t>
             </a:fld>
             <a:endParaRPr lang="en-US"/>
           </a:p>
@@ -2048,7 +2045,7 @@
           <a:p>
             <a:fld id="{910CFE7C-6ECA-BA41-9F48-D6F45386F99D}" type="datetime1">
               <a:rPr lang="en-GB" smtClean="0"/>
-              <a:t>11/03/2014</a:t>
+              <a:t>31/03/2014</a:t>
             </a:fld>
             <a:endParaRPr lang="en-US"/>
           </a:p>
@@ -2352,7 +2349,7 @@
           <a:p>
             <a:fld id="{71B27045-763F-A246-90B8-33F456A59D81}" type="datetime1">
               <a:rPr lang="en-GB" smtClean="0"/>
-              <a:t>11/03/2014</a:t>
+              <a:t>31/03/2014</a:t>
             </a:fld>
             <a:endParaRPr lang="en-US"/>
           </a:p>
@@ -2829,7 +2826,7 @@
           <a:p>
             <a:fld id="{3F59B29C-F89D-474D-B011-AB6D8ADC53E8}" type="datetime1">
               <a:rPr lang="en-GB" smtClean="0"/>
-              <a:t>11/03/2014</a:t>
+              <a:t>31/03/2014</a:t>
             </a:fld>
             <a:endParaRPr lang="en-US"/>
           </a:p>
@@ -3002,7 +2999,7 @@
           <a:p>
             <a:fld id="{3DCCBAD8-F009-9A4A-97A6-3534E655F1A4}" type="datetime1">
               <a:rPr lang="en-GB" smtClean="0"/>
-              <a:t>11/03/2014</a:t>
+              <a:t>31/03/2014</a:t>
             </a:fld>
             <a:endParaRPr lang="en-US"/>
           </a:p>
@@ -3152,7 +3149,7 @@
           <a:p>
             <a:fld id="{E2962A09-8101-6143-B3E1-275BADB4A740}" type="datetime1">
               <a:rPr lang="en-GB" smtClean="0"/>
-              <a:t>11/03/2014</a:t>
+              <a:t>31/03/2014</a:t>
             </a:fld>
             <a:endParaRPr lang="en-US"/>
           </a:p>
@@ -3445,7 +3442,7 @@
           <a:p>
             <a:fld id="{466E7363-AFAF-A041-B05D-16199A2EC6B5}" type="datetime1">
               <a:rPr lang="en-GB" smtClean="0"/>
-              <a:t>11/03/2014</a:t>
+              <a:t>31/03/2014</a:t>
             </a:fld>
             <a:endParaRPr lang="en-US"/>
           </a:p>
@@ -3714,7 +3711,7 @@
           <a:p>
             <a:fld id="{1E991531-8BCA-364C-B8A6-399A9E93C78F}" type="datetime1">
               <a:rPr lang="en-GB" smtClean="0"/>
-              <a:t>11/03/2014</a:t>
+              <a:t>31/03/2014</a:t>
             </a:fld>
             <a:endParaRPr lang="en-US"/>
           </a:p>
@@ -4117,31 +4114,7 @@
                 <a:latin typeface="Roboto Light"/>
                 <a:cs typeface="Roboto Light"/>
               </a:rPr>
-              <a:t>Lesson </a:t>
-            </a:r>
-            <a:r>
-              <a:rPr lang="en-US" sz="1200" b="0" i="0" dirty="0" smtClean="0">
-                <a:solidFill>
-                  <a:schemeClr val="bg1">
-                    <a:lumMod val="50000"/>
-                  </a:schemeClr>
-                </a:solidFill>
-                <a:latin typeface="Roboto Light"/>
-                <a:cs typeface="Roboto Light"/>
-              </a:rPr>
-              <a:t>4 </a:t>
-            </a:r>
-            <a:r>
-              <a:rPr lang="en-US" sz="1200" b="0" i="0" dirty="0" smtClean="0">
-                <a:solidFill>
-                  <a:schemeClr val="bg1">
-                    <a:lumMod val="50000"/>
-                  </a:schemeClr>
-                </a:solidFill>
-                <a:latin typeface="Roboto Light"/>
-                <a:cs typeface="Roboto Light"/>
-              </a:rPr>
-              <a:t>– </a:t>
+              <a:t>Lesson 4 – </a:t>
             </a:r>
             <a:r>
               <a:rPr lang="fr-FR" sz="1200" b="0" i="0" dirty="0" smtClean="0">
@@ -4153,19 +4126,7 @@
                 <a:latin typeface="Roboto Light"/>
                 <a:cs typeface="Roboto Light"/>
               </a:rPr>
-              <a:t>https://github.com/scruffyfox/AndroidCourse/tree/Lesson</a:t>
-            </a:r>
-            <a:r>
-              <a:rPr lang="fr-FR" sz="1200" b="0" i="0" dirty="0" smtClean="0">
-                <a:solidFill>
-                  <a:schemeClr val="bg1">
-                    <a:lumMod val="50000"/>
-                  </a:schemeClr>
-                </a:solidFill>
-                <a:latin typeface="Roboto Light"/>
-                <a:cs typeface="Roboto Light"/>
-              </a:rPr>
-              <a:t>-4</a:t>
+              <a:t>https://github.com/scruffyfox/AndroidCourse/tree/Lesson-4</a:t>
             </a:r>
             <a:endParaRPr lang="en-US" sz="1200" b="0" i="0" dirty="0" smtClean="0">
               <a:solidFill>
@@ -4559,15 +4520,7 @@
           <a:p>
             <a:r>
               <a:rPr lang="en-US" dirty="0" smtClean="0"/>
-              <a:t>Lesson </a:t>
-            </a:r>
-            <a:r>
-              <a:rPr lang="en-US" dirty="0" smtClean="0"/>
-              <a:t>4 by </a:t>
-            </a:r>
-            <a:r>
-              <a:rPr lang="en-US" dirty="0" smtClean="0"/>
-              <a:t>Callum Taylor</a:t>
+              <a:t>Lesson 4 by Callum Taylor</a:t>
             </a:r>
             <a:endParaRPr lang="en-US" dirty="0"/>
           </a:p>
@@ -4951,11 +4904,7 @@
           <a:p>
             <a:r>
               <a:rPr lang="fr-FR" dirty="0" smtClean="0"/>
-              <a:t>https://github.com/scruffyfox/AndroidCourse/tree/Lesson</a:t>
-            </a:r>
-            <a:r>
-              <a:rPr lang="fr-FR" dirty="0" smtClean="0"/>
-              <a:t>-4 </a:t>
+              <a:t>https://github.com/scruffyfox/AndroidCourse/tree/Lesson-4 </a:t>
             </a:r>
             <a:endParaRPr lang="en-US" dirty="0"/>
           </a:p>
@@ -5202,14 +5151,6 @@
               </a:rPr>
               <a:t>Loading from an API</a:t>
             </a:r>
-            <a:endParaRPr lang="en-US" dirty="0" smtClean="0">
-              <a:solidFill>
-                <a:schemeClr val="tx1">
-                  <a:lumMod val="65000"/>
-                  <a:lumOff val="35000"/>
-                </a:schemeClr>
-              </a:solidFill>
-            </a:endParaRPr>
           </a:p>
           <a:p>
             <a:endParaRPr lang="en-US" dirty="0" smtClean="0">
@@ -5233,14 +5174,6 @@
               </a:rPr>
               <a:t>Caching models to disk</a:t>
             </a:r>
-            <a:endParaRPr lang="en-US" dirty="0" smtClean="0">
-              <a:solidFill>
-                <a:schemeClr val="tx1">
-                  <a:lumMod val="65000"/>
-                  <a:lumOff val="35000"/>
-                </a:schemeClr>
-              </a:solidFill>
-            </a:endParaRPr>
           </a:p>
           <a:p>
             <a:endParaRPr lang="en-US" dirty="0" smtClean="0">
@@ -5264,14 +5197,6 @@
               </a:rPr>
               <a:t>Web Views</a:t>
             </a:r>
-            <a:endParaRPr lang="en-US" dirty="0" smtClean="0">
-              <a:solidFill>
-                <a:schemeClr val="tx1">
-                  <a:lumMod val="65000"/>
-                  <a:lumOff val="35000"/>
-                </a:schemeClr>
-              </a:solidFill>
-            </a:endParaRPr>
           </a:p>
         </p:txBody>
       </p:sp>
@@ -5279,6 +5204,170 @@
     <p:extLst>
       <p:ext uri="{BB962C8B-B14F-4D97-AF65-F5344CB8AC3E}">
         <p14:creationId xmlns:p14="http://schemas.microsoft.com/office/powerpoint/2010/main" val="3469136838"/>
+      </p:ext>
+    </p:extLst>
+  </p:cSld>
+  <p:clrMapOvr>
+    <a:masterClrMapping/>
+  </p:clrMapOvr>
+  <p:timing>
+    <p:tnLst>
+      <p:par>
+        <p:cTn xmlns:p14="http://schemas.microsoft.com/office/powerpoint/2010/main" id="1" dur="indefinite" restart="never" nodeType="tmRoot"/>
+      </p:par>
+    </p:tnLst>
+  </p:timing>
+</p:sld>
+</file>
+
+<file path=ppt/slides/slide6.xml><?xml version="1.0" encoding="utf-8"?>
+<p:sld xmlns:a="http://schemas.openxmlformats.org/drawingml/2006/main" xmlns:r="http://schemas.openxmlformats.org/officeDocument/2006/relationships" xmlns:p="http://schemas.openxmlformats.org/presentationml/2006/main">
+  <p:cSld>
+    <p:spTree>
+      <p:nvGrpSpPr>
+        <p:cNvPr id="1" name=""/>
+        <p:cNvGrpSpPr/>
+        <p:nvPr/>
+      </p:nvGrpSpPr>
+      <p:grpSpPr>
+        <a:xfrm>
+          <a:off x="0" y="0"/>
+          <a:ext cx="0" cy="0"/>
+          <a:chOff x="0" y="0"/>
+          <a:chExt cx="0" cy="0"/>
+        </a:xfrm>
+      </p:grpSpPr>
+      <p:sp>
+        <p:nvSpPr>
+          <p:cNvPr id="2" name="Title 1"/>
+          <p:cNvSpPr>
+            <a:spLocks noGrp="1"/>
+          </p:cNvSpPr>
+          <p:nvPr>
+            <p:ph type="title"/>
+          </p:nvPr>
+        </p:nvSpPr>
+        <p:spPr/>
+        <p:txBody>
+          <a:bodyPr/>
+          <a:lstStyle/>
+          <a:p>
+            <a:r>
+              <a:rPr lang="en-US" dirty="0" smtClean="0"/>
+              <a:t>Async Http Client</a:t>
+            </a:r>
+            <a:endParaRPr lang="en-US" dirty="0"/>
+          </a:p>
+        </p:txBody>
+      </p:sp>
+      <p:sp>
+        <p:nvSpPr>
+          <p:cNvPr id="3" name="Content Placeholder 2"/>
+          <p:cNvSpPr>
+            <a:spLocks noGrp="1"/>
+          </p:cNvSpPr>
+          <p:nvPr>
+            <p:ph idx="1"/>
+          </p:nvPr>
+        </p:nvSpPr>
+        <p:spPr/>
+        <p:txBody>
+          <a:bodyPr/>
+          <a:lstStyle/>
+          <a:p>
+            <a:r>
+              <a:rPr lang="en-US" dirty="0"/>
+              <a:t>https://github.com/scruffyfox/AsyncHttpClient</a:t>
+            </a:r>
+          </a:p>
+        </p:txBody>
+      </p:sp>
+    </p:spTree>
+    <p:extLst>
+      <p:ext uri="{BB962C8B-B14F-4D97-AF65-F5344CB8AC3E}">
+        <p14:creationId xmlns:p14="http://schemas.microsoft.com/office/powerpoint/2010/main" val="4004983934"/>
+      </p:ext>
+    </p:extLst>
+  </p:cSld>
+  <p:clrMapOvr>
+    <a:masterClrMapping/>
+  </p:clrMapOvr>
+  <p:timing>
+    <p:tnLst>
+      <p:par>
+        <p:cTn xmlns:p14="http://schemas.microsoft.com/office/powerpoint/2010/main" id="1" dur="indefinite" restart="never" nodeType="tmRoot"/>
+      </p:par>
+    </p:tnLst>
+  </p:timing>
+</p:sld>
+</file>
+
+<file path=ppt/slides/slide7.xml><?xml version="1.0" encoding="utf-8"?>
+<p:sld xmlns:a="http://schemas.openxmlformats.org/drawingml/2006/main" xmlns:r="http://schemas.openxmlformats.org/officeDocument/2006/relationships" xmlns:p="http://schemas.openxmlformats.org/presentationml/2006/main">
+  <p:cSld>
+    <p:spTree>
+      <p:nvGrpSpPr>
+        <p:cNvPr id="1" name=""/>
+        <p:cNvGrpSpPr/>
+        <p:nvPr/>
+      </p:nvGrpSpPr>
+      <p:grpSpPr>
+        <a:xfrm>
+          <a:off x="0" y="0"/>
+          <a:ext cx="0" cy="0"/>
+          <a:chOff x="0" y="0"/>
+          <a:chExt cx="0" cy="0"/>
+        </a:xfrm>
+      </p:grpSpPr>
+      <p:sp>
+        <p:nvSpPr>
+          <p:cNvPr id="2" name="Title 1"/>
+          <p:cNvSpPr>
+            <a:spLocks noGrp="1"/>
+          </p:cNvSpPr>
+          <p:nvPr>
+            <p:ph type="title"/>
+          </p:nvPr>
+        </p:nvSpPr>
+        <p:spPr/>
+        <p:txBody>
+          <a:bodyPr/>
+          <a:lstStyle/>
+          <a:p>
+            <a:r>
+              <a:rPr lang="en-US" dirty="0" smtClean="0"/>
+              <a:t>API	</a:t>
+            </a:r>
+            <a:endParaRPr lang="en-US" dirty="0"/>
+          </a:p>
+        </p:txBody>
+      </p:sp>
+      <p:sp>
+        <p:nvSpPr>
+          <p:cNvPr id="3" name="Content Placeholder 2"/>
+          <p:cNvSpPr>
+            <a:spLocks noGrp="1"/>
+          </p:cNvSpPr>
+          <p:nvPr>
+            <p:ph idx="1"/>
+          </p:nvPr>
+        </p:nvSpPr>
+        <p:spPr/>
+        <p:txBody>
+          <a:bodyPr/>
+          <a:lstStyle/>
+          <a:p>
+            <a:r>
+              <a:rPr lang="en-US" dirty="0"/>
+              <a:t>http://android.3sidedcube.com/bbcnews/</a:t>
+            </a:r>
+          </a:p>
+        </p:txBody>
+      </p:sp>
+    </p:spTree>
+    <p:extLst>
+      <p:ext uri="{BB962C8B-B14F-4D97-AF65-F5344CB8AC3E}">
+        <p14:creationId xmlns:p14="http://schemas.microsoft.com/office/powerpoint/2010/main" val="3224016722"/>
       </p:ext>
     </p:extLst>
   </p:cSld>

</xml_diff>